<commit_message>
12.31 simulink ppt added
</commit_message>
<xml_diff>
--- a/simulink VMS tools.pptx
+++ b/simulink VMS tools.pptx
@@ -6799,7 +6799,7 @@
           <a:p>
             <a:fld id="{A691CE37-CB5B-47D0-994C-03E1225AE35C}" type="datetimeFigureOut">
               <a:rPr lang="ko-KR" altLang="en-US" smtClean="0"/>
-              <a:t>2019-12-30</a:t>
+              <a:t>2019-12-31</a:t>
             </a:fld>
             <a:endParaRPr lang="ko-KR" altLang="en-US"/>
           </a:p>
@@ -9126,13 +9126,18 @@
           <a:bodyPr/>
           <a:lstStyle/>
           <a:p>
+            <a:pPr>
+              <a:buSzPct val="100000"/>
+            </a:pPr>
             <a:r>
               <a:rPr lang="en-US" altLang="ko-KR" dirty="0" smtClean="0"/>
               <a:t>Simulink viewer</a:t>
             </a:r>
           </a:p>
           <a:p>
-            <a:pPr lvl="1"/>
+            <a:pPr lvl="1">
+              <a:buSzPct val="100000"/>
+            </a:pPr>
             <a:r>
               <a:rPr lang="en-US" altLang="ko-KR" dirty="0" smtClean="0"/>
               <a:t>Simulink</a:t>
@@ -9144,7 +9149,9 @@
             <a:endParaRPr lang="en-US" altLang="ko-KR" dirty="0" smtClean="0"/>
           </a:p>
           <a:p>
-            <a:pPr lvl="1"/>
+            <a:pPr lvl="1">
+              <a:buSzPct val="100000"/>
+            </a:pPr>
             <a:r>
               <a:rPr lang="ko-KR" altLang="en-US" dirty="0" smtClean="0"/>
               <a:t>현재 모델의 구성과 작업 </a:t>
@@ -9160,6 +9167,9 @@
             <a:endParaRPr lang="en-US" altLang="ko-KR" dirty="0" smtClean="0"/>
           </a:p>
           <a:p>
+            <a:pPr>
+              <a:buSzPct val="100000"/>
+            </a:pPr>
             <a:endParaRPr lang="ko-KR" altLang="en-US" dirty="0"/>
           </a:p>
         </p:txBody>

</xml_diff>